<commit_message>
Final comit for the night
</commit_message>
<xml_diff>
--- a/Documents/Powerpoints/3.0 FileIO.pptx
+++ b/Documents/Powerpoints/3.0 FileIO.pptx
@@ -5,21 +5,24 @@
     <p:sldMasterId id="2147483666" r:id="rId1"/>
   </p:sldMasterIdLst>
   <p:notesMasterIdLst>
-    <p:notesMasterId r:id="rId7"/>
+    <p:notesMasterId r:id="rId10"/>
   </p:notesMasterIdLst>
   <p:sldIdLst>
     <p:sldId id="256" r:id="rId2"/>
     <p:sldId id="257" r:id="rId3"/>
     <p:sldId id="258" r:id="rId4"/>
-    <p:sldId id="259" r:id="rId5"/>
-    <p:sldId id="260" r:id="rId6"/>
+    <p:sldId id="262" r:id="rId5"/>
+    <p:sldId id="259" r:id="rId6"/>
+    <p:sldId id="260" r:id="rId7"/>
+    <p:sldId id="261" r:id="rId8"/>
+    <p:sldId id="263" r:id="rId9"/>
   </p:sldIdLst>
   <p:sldSz cx="9144000" cy="5143500" type="screen16x9"/>
   <p:notesSz cx="6858000" cy="9144000"/>
   <p:embeddedFontLst>
     <p:embeddedFont>
       <p:font typeface="Lustria" panose="020B0604020202020204" charset="0"/>
-      <p:regular r:id="rId8"/>
+      <p:regular r:id="rId11"/>
     </p:embeddedFont>
   </p:embeddedFontLst>
   <p:defaultTextStyle>
@@ -23195,6 +23198,107 @@
           <p:cNvPr id="2" name="Title 1">
             <a:extLst>
               <a:ext uri="{FF2B5EF4-FFF2-40B4-BE49-F238E27FC236}">
+                <a16:creationId xmlns:a16="http://schemas.microsoft.com/office/drawing/2014/main" id="{879FD6B3-8084-4568-8D28-EC547E83AF3A}"/>
+              </a:ext>
+            </a:extLst>
+          </p:cNvPr>
+          <p:cNvSpPr>
+            <a:spLocks noGrp="1"/>
+          </p:cNvSpPr>
+          <p:nvPr>
+            <p:ph type="title"/>
+          </p:nvPr>
+        </p:nvSpPr>
+        <p:spPr/>
+        <p:txBody>
+          <a:bodyPr/>
+          <a:lstStyle/>
+          <a:p>
+            <a:r>
+              <a:rPr lang="en-US" dirty="0"/>
+              <a:t>Warning</a:t>
+            </a:r>
+          </a:p>
+        </p:txBody>
+      </p:sp>
+      <p:sp>
+        <p:nvSpPr>
+          <p:cNvPr id="3" name="Text Placeholder 2">
+            <a:extLst>
+              <a:ext uri="{FF2B5EF4-FFF2-40B4-BE49-F238E27FC236}">
+                <a16:creationId xmlns:a16="http://schemas.microsoft.com/office/drawing/2014/main" id="{EF8AC02F-D282-4A55-85A1-24A6A20ADC1F}"/>
+              </a:ext>
+            </a:extLst>
+          </p:cNvPr>
+          <p:cNvSpPr>
+            <a:spLocks noGrp="1"/>
+          </p:cNvSpPr>
+          <p:nvPr>
+            <p:ph type="body" idx="1"/>
+          </p:nvPr>
+        </p:nvSpPr>
+        <p:spPr/>
+        <p:txBody>
+          <a:bodyPr/>
+          <a:lstStyle/>
+          <a:p>
+            <a:r>
+              <a:rPr lang="en-US" dirty="0"/>
+              <a:t>The most common error that you will encounter says that…</a:t>
+            </a:r>
+          </a:p>
+          <a:p>
+            <a:r>
+              <a:rPr lang="en-US" dirty="0"/>
+              <a:t>“blah blah does not exist in current context”</a:t>
+            </a:r>
+          </a:p>
+          <a:p>
+            <a:endParaRPr lang="en-US" dirty="0"/>
+          </a:p>
+          <a:p>
+            <a:r>
+              <a:rPr lang="en-US" dirty="0"/>
+              <a:t>Using system.io</a:t>
+            </a:r>
+          </a:p>
+        </p:txBody>
+      </p:sp>
+    </p:spTree>
+    <p:extLst>
+      <p:ext uri="{BB962C8B-B14F-4D97-AF65-F5344CB8AC3E}">
+        <p14:creationId xmlns:p14="http://schemas.microsoft.com/office/powerpoint/2010/main" val="3683336264"/>
+      </p:ext>
+    </p:extLst>
+  </p:cSld>
+  <p:clrMapOvr>
+    <a:masterClrMapping/>
+  </p:clrMapOvr>
+</p:sld>
+</file>
+
+<file path=ppt/slides/slide5.xml><?xml version="1.0" encoding="utf-8"?>
+<p:sld xmlns:a="http://schemas.openxmlformats.org/drawingml/2006/main" xmlns:r="http://schemas.openxmlformats.org/officeDocument/2006/relationships" xmlns:p="http://schemas.openxmlformats.org/presentationml/2006/main">
+  <p:cSld>
+    <p:spTree>
+      <p:nvGrpSpPr>
+        <p:cNvPr id="1" name=""/>
+        <p:cNvGrpSpPr/>
+        <p:nvPr/>
+      </p:nvGrpSpPr>
+      <p:grpSpPr>
+        <a:xfrm>
+          <a:off x="0" y="0"/>
+          <a:ext cx="0" cy="0"/>
+          <a:chOff x="0" y="0"/>
+          <a:chExt cx="0" cy="0"/>
+        </a:xfrm>
+      </p:grpSpPr>
+      <p:sp>
+        <p:nvSpPr>
+          <p:cNvPr id="2" name="Title 1">
+            <a:extLst>
+              <a:ext uri="{FF2B5EF4-FFF2-40B4-BE49-F238E27FC236}">
                 <a16:creationId xmlns:a16="http://schemas.microsoft.com/office/drawing/2014/main" id="{6759892F-61DF-491A-B9F0-0602607F3475}"/>
               </a:ext>
             </a:extLst>
@@ -23273,7 +23377,7 @@
 </p:sld>
 </file>
 
-<file path=ppt/slides/slide5.xml><?xml version="1.0" encoding="utf-8"?>
+<file path=ppt/slides/slide6.xml><?xml version="1.0" encoding="utf-8"?>
 <p:sld xmlns:a="http://schemas.openxmlformats.org/drawingml/2006/main" xmlns:r="http://schemas.openxmlformats.org/officeDocument/2006/relationships" xmlns:p="http://schemas.openxmlformats.org/presentationml/2006/main">
   <p:cSld>
     <p:spTree>
@@ -23364,6 +23468,215 @@
     <p:extLst>
       <p:ext uri="{BB962C8B-B14F-4D97-AF65-F5344CB8AC3E}">
         <p14:creationId xmlns:p14="http://schemas.microsoft.com/office/powerpoint/2010/main" val="591092030"/>
+      </p:ext>
+    </p:extLst>
+  </p:cSld>
+  <p:clrMapOvr>
+    <a:masterClrMapping/>
+  </p:clrMapOvr>
+</p:sld>
+</file>
+
+<file path=ppt/slides/slide7.xml><?xml version="1.0" encoding="utf-8"?>
+<p:sld xmlns:a="http://schemas.openxmlformats.org/drawingml/2006/main" xmlns:r="http://schemas.openxmlformats.org/officeDocument/2006/relationships" xmlns:p="http://schemas.openxmlformats.org/presentationml/2006/main">
+  <p:cSld>
+    <p:spTree>
+      <p:nvGrpSpPr>
+        <p:cNvPr id="1" name=""/>
+        <p:cNvGrpSpPr/>
+        <p:nvPr/>
+      </p:nvGrpSpPr>
+      <p:grpSpPr>
+        <a:xfrm>
+          <a:off x="0" y="0"/>
+          <a:ext cx="0" cy="0"/>
+          <a:chOff x="0" y="0"/>
+          <a:chExt cx="0" cy="0"/>
+        </a:xfrm>
+      </p:grpSpPr>
+      <p:sp>
+        <p:nvSpPr>
+          <p:cNvPr id="2" name="Title 1">
+            <a:extLst>
+              <a:ext uri="{FF2B5EF4-FFF2-40B4-BE49-F238E27FC236}">
+                <a16:creationId xmlns:a16="http://schemas.microsoft.com/office/drawing/2014/main" id="{0E1590BB-6BE8-42F7-83DE-E6CE8BBF6439}"/>
+              </a:ext>
+            </a:extLst>
+          </p:cNvPr>
+          <p:cNvSpPr>
+            <a:spLocks noGrp="1"/>
+          </p:cNvSpPr>
+          <p:nvPr>
+            <p:ph type="title"/>
+          </p:nvPr>
+        </p:nvSpPr>
+        <p:spPr/>
+        <p:txBody>
+          <a:bodyPr/>
+          <a:lstStyle/>
+          <a:p>
+            <a:r>
+              <a:rPr lang="en-US" dirty="0"/>
+              <a:t>Many Other Ways</a:t>
+            </a:r>
+          </a:p>
+        </p:txBody>
+      </p:sp>
+      <p:sp>
+        <p:nvSpPr>
+          <p:cNvPr id="3" name="Text Placeholder 2">
+            <a:extLst>
+              <a:ext uri="{FF2B5EF4-FFF2-40B4-BE49-F238E27FC236}">
+                <a16:creationId xmlns:a16="http://schemas.microsoft.com/office/drawing/2014/main" id="{B9E46704-E451-4D52-BEC8-C95DC93664D5}"/>
+              </a:ext>
+            </a:extLst>
+          </p:cNvPr>
+          <p:cNvSpPr>
+            <a:spLocks noGrp="1"/>
+          </p:cNvSpPr>
+          <p:nvPr>
+            <p:ph type="body" idx="1"/>
+          </p:nvPr>
+        </p:nvSpPr>
+        <p:spPr/>
+        <p:txBody>
+          <a:bodyPr/>
+          <a:lstStyle/>
+          <a:p>
+            <a:r>
+              <a:rPr lang="en-US" dirty="0">
+                <a:hlinkClick r:id="rId2"/>
+              </a:rPr>
+              <a:t>https://docs.microsoft.com/en-us/dotnet/standard/io/</a:t>
+            </a:r>
+            <a:endParaRPr lang="en-US" dirty="0"/>
+          </a:p>
+          <a:p>
+            <a:r>
+              <a:rPr lang="en-US" dirty="0"/>
+              <a:t>For the scope of this class we will only be talking about a small portion of .NETs </a:t>
+            </a:r>
+            <a:r>
+              <a:rPr lang="en-US" dirty="0" err="1"/>
+              <a:t>FileIO</a:t>
+            </a:r>
+            <a:r>
+              <a:rPr lang="en-US" dirty="0"/>
+              <a:t>.</a:t>
+            </a:r>
+          </a:p>
+          <a:p>
+            <a:r>
+              <a:rPr lang="en-US" dirty="0"/>
+              <a:t>Thankfully, we can do a ton of powerful stuff with just the few bits we will discuss.</a:t>
+            </a:r>
+          </a:p>
+        </p:txBody>
+      </p:sp>
+    </p:spTree>
+    <p:extLst>
+      <p:ext uri="{BB962C8B-B14F-4D97-AF65-F5344CB8AC3E}">
+        <p14:creationId xmlns:p14="http://schemas.microsoft.com/office/powerpoint/2010/main" val="3990483600"/>
+      </p:ext>
+    </p:extLst>
+  </p:cSld>
+  <p:clrMapOvr>
+    <a:masterClrMapping/>
+  </p:clrMapOvr>
+</p:sld>
+</file>
+
+<file path=ppt/slides/slide8.xml><?xml version="1.0" encoding="utf-8"?>
+<p:sld xmlns:a="http://schemas.openxmlformats.org/drawingml/2006/main" xmlns:r="http://schemas.openxmlformats.org/officeDocument/2006/relationships" xmlns:p="http://schemas.openxmlformats.org/presentationml/2006/main">
+  <p:cSld>
+    <p:spTree>
+      <p:nvGrpSpPr>
+        <p:cNvPr id="1" name=""/>
+        <p:cNvGrpSpPr/>
+        <p:nvPr/>
+      </p:nvGrpSpPr>
+      <p:grpSpPr>
+        <a:xfrm>
+          <a:off x="0" y="0"/>
+          <a:ext cx="0" cy="0"/>
+          <a:chOff x="0" y="0"/>
+          <a:chExt cx="0" cy="0"/>
+        </a:xfrm>
+      </p:grpSpPr>
+      <p:sp>
+        <p:nvSpPr>
+          <p:cNvPr id="2" name="Title 1">
+            <a:extLst>
+              <a:ext uri="{FF2B5EF4-FFF2-40B4-BE49-F238E27FC236}">
+                <a16:creationId xmlns:a16="http://schemas.microsoft.com/office/drawing/2014/main" id="{196AE8AD-6EC1-4ECB-B324-917361D99514}"/>
+              </a:ext>
+            </a:extLst>
+          </p:cNvPr>
+          <p:cNvSpPr>
+            <a:spLocks noGrp="1"/>
+          </p:cNvSpPr>
+          <p:nvPr>
+            <p:ph type="title"/>
+          </p:nvPr>
+        </p:nvSpPr>
+        <p:spPr/>
+        <p:txBody>
+          <a:bodyPr/>
+          <a:lstStyle/>
+          <a:p>
+            <a:r>
+              <a:rPr lang="en-US" dirty="0"/>
+              <a:t>Lab</a:t>
+            </a:r>
+          </a:p>
+        </p:txBody>
+      </p:sp>
+      <p:sp>
+        <p:nvSpPr>
+          <p:cNvPr id="3" name="Text Placeholder 2">
+            <a:extLst>
+              <a:ext uri="{FF2B5EF4-FFF2-40B4-BE49-F238E27FC236}">
+                <a16:creationId xmlns:a16="http://schemas.microsoft.com/office/drawing/2014/main" id="{6E93473F-69BC-4554-9952-D144400ECE2B}"/>
+              </a:ext>
+            </a:extLst>
+          </p:cNvPr>
+          <p:cNvSpPr>
+            <a:spLocks noGrp="1"/>
+          </p:cNvSpPr>
+          <p:nvPr>
+            <p:ph type="body" idx="1"/>
+          </p:nvPr>
+        </p:nvSpPr>
+        <p:spPr/>
+        <p:txBody>
+          <a:bodyPr/>
+          <a:lstStyle/>
+          <a:p>
+            <a:r>
+              <a:rPr lang="en-US" dirty="0"/>
+              <a:t>On canvas there is a zip file containing a fairly interesting folder structure with a single file hidden inside.</a:t>
+            </a:r>
+          </a:p>
+          <a:p>
+            <a:r>
+              <a:rPr lang="en-US" dirty="0"/>
+              <a:t>Your objective is to use file </a:t>
+            </a:r>
+            <a:r>
+              <a:rPr lang="en-US" dirty="0" err="1"/>
+              <a:t>io</a:t>
+            </a:r>
+            <a:r>
+              <a:rPr lang="en-US" dirty="0"/>
+              <a:t> and recursion to find the path of the file.</a:t>
+            </a:r>
+          </a:p>
+        </p:txBody>
+      </p:sp>
+    </p:spTree>
+    <p:extLst>
+      <p:ext uri="{BB962C8B-B14F-4D97-AF65-F5344CB8AC3E}">
+        <p14:creationId xmlns:p14="http://schemas.microsoft.com/office/powerpoint/2010/main" val="1485592930"/>
       </p:ext>
     </p:extLst>
   </p:cSld>

</xml_diff>